<commit_message>
Updating report after adding validation set in analysis
</commit_message>
<xml_diff>
--- a/Report/Erdosfall2024_Car_sales_price_prediction_talk.pptx
+++ b/Report/Erdosfall2024_Car_sales_price_prediction_talk.pptx
@@ -204,7 +204,7 @@
           <a:p>
             <a:fld id="{7D1BD353-0E3F-4F7F-B2DA-DDB1E24F65DD}" type="datetimeFigureOut">
               <a:rPr lang="en-US" smtClean="0"/>
-              <a:t>11/26/2024</a:t>
+              <a:t>12/16/2024</a:t>
             </a:fld>
             <a:endParaRPr lang="en-US"/>
           </a:p>
@@ -1140,7 +1140,7 @@
           <a:p>
             <a:fld id="{8C737111-AB33-4E78-99FF-07CB70C4A694}" type="datetimeFigureOut">
               <a:rPr lang="en-US" smtClean="0"/>
-              <a:t>11/26/2024</a:t>
+              <a:t>12/16/2024</a:t>
             </a:fld>
             <a:endParaRPr lang="en-US"/>
           </a:p>
@@ -1338,7 +1338,7 @@
           <a:p>
             <a:fld id="{8C737111-AB33-4E78-99FF-07CB70C4A694}" type="datetimeFigureOut">
               <a:rPr lang="en-US" smtClean="0"/>
-              <a:t>11/26/2024</a:t>
+              <a:t>12/16/2024</a:t>
             </a:fld>
             <a:endParaRPr lang="en-US"/>
           </a:p>
@@ -1546,7 +1546,7 @@
           <a:p>
             <a:fld id="{8C737111-AB33-4E78-99FF-07CB70C4A694}" type="datetimeFigureOut">
               <a:rPr lang="en-US" smtClean="0"/>
-              <a:t>11/26/2024</a:t>
+              <a:t>12/16/2024</a:t>
             </a:fld>
             <a:endParaRPr lang="en-US"/>
           </a:p>
@@ -1744,7 +1744,7 @@
           <a:p>
             <a:fld id="{8C737111-AB33-4E78-99FF-07CB70C4A694}" type="datetimeFigureOut">
               <a:rPr lang="en-US" smtClean="0"/>
-              <a:t>11/26/2024</a:t>
+              <a:t>12/16/2024</a:t>
             </a:fld>
             <a:endParaRPr lang="en-US"/>
           </a:p>
@@ -2019,7 +2019,7 @@
           <a:p>
             <a:fld id="{8C737111-AB33-4E78-99FF-07CB70C4A694}" type="datetimeFigureOut">
               <a:rPr lang="en-US" smtClean="0"/>
-              <a:t>11/26/2024</a:t>
+              <a:t>12/16/2024</a:t>
             </a:fld>
             <a:endParaRPr lang="en-US"/>
           </a:p>
@@ -2284,7 +2284,7 @@
           <a:p>
             <a:fld id="{8C737111-AB33-4E78-99FF-07CB70C4A694}" type="datetimeFigureOut">
               <a:rPr lang="en-US" smtClean="0"/>
-              <a:t>11/26/2024</a:t>
+              <a:t>12/16/2024</a:t>
             </a:fld>
             <a:endParaRPr lang="en-US"/>
           </a:p>
@@ -2696,7 +2696,7 @@
           <a:p>
             <a:fld id="{8C737111-AB33-4E78-99FF-07CB70C4A694}" type="datetimeFigureOut">
               <a:rPr lang="en-US" smtClean="0"/>
-              <a:t>11/26/2024</a:t>
+              <a:t>12/16/2024</a:t>
             </a:fld>
             <a:endParaRPr lang="en-US"/>
           </a:p>
@@ -2837,7 +2837,7 @@
           <a:p>
             <a:fld id="{8C737111-AB33-4E78-99FF-07CB70C4A694}" type="datetimeFigureOut">
               <a:rPr lang="en-US" smtClean="0"/>
-              <a:t>11/26/2024</a:t>
+              <a:t>12/16/2024</a:t>
             </a:fld>
             <a:endParaRPr lang="en-US"/>
           </a:p>
@@ -2950,7 +2950,7 @@
           <a:p>
             <a:fld id="{8C737111-AB33-4E78-99FF-07CB70C4A694}" type="datetimeFigureOut">
               <a:rPr lang="en-US" smtClean="0"/>
-              <a:t>11/26/2024</a:t>
+              <a:t>12/16/2024</a:t>
             </a:fld>
             <a:endParaRPr lang="en-US"/>
           </a:p>
@@ -3261,7 +3261,7 @@
           <a:p>
             <a:fld id="{8C737111-AB33-4E78-99FF-07CB70C4A694}" type="datetimeFigureOut">
               <a:rPr lang="en-US" smtClean="0"/>
-              <a:t>11/26/2024</a:t>
+              <a:t>12/16/2024</a:t>
             </a:fld>
             <a:endParaRPr lang="en-US"/>
           </a:p>
@@ -3549,7 +3549,7 @@
           <a:p>
             <a:fld id="{8C737111-AB33-4E78-99FF-07CB70C4A694}" type="datetimeFigureOut">
               <a:rPr lang="en-US" smtClean="0"/>
-              <a:t>11/26/2024</a:t>
+              <a:t>12/16/2024</a:t>
             </a:fld>
             <a:endParaRPr lang="en-US"/>
           </a:p>
@@ -3790,7 +3790,7 @@
           <a:p>
             <a:fld id="{8C737111-AB33-4E78-99FF-07CB70C4A694}" type="datetimeFigureOut">
               <a:rPr lang="en-US" smtClean="0"/>
-              <a:t>11/26/2024</a:t>
+              <a:t>12/16/2024</a:t>
             </a:fld>
             <a:endParaRPr lang="en-US"/>
           </a:p>
@@ -6811,110 +6811,200 @@
           </a:p>
         </p:txBody>
       </p:sp>
-      <p:sp>
-        <p:nvSpPr>
-          <p:cNvPr id="2" name="TextBox 1"/>
-          <p:cNvSpPr txBox="1"/>
-          <p:nvPr/>
-        </p:nvSpPr>
-        <p:spPr>
-          <a:xfrm>
-            <a:off x="347663" y="708553"/>
-            <a:ext cx="11006137" cy="1015663"/>
-          </a:xfrm>
-          <a:prstGeom prst="rect">
-            <a:avLst/>
-          </a:prstGeom>
-          <a:noFill/>
-        </p:spPr>
-        <p:txBody>
-          <a:bodyPr wrap="square" rtlCol="0">
-            <a:spAutoFit/>
-          </a:bodyPr>
-          <a:lstStyle/>
-          <a:p>
-            <a:pPr marL="285750" indent="-285750">
-              <a:buFont typeface="Wingdings" charset="2"/>
-              <a:buChar char="q"/>
-            </a:pPr>
-            <a:r>
-              <a:rPr lang="en-US" sz="2000" b="0" i="0" dirty="0">
-                <a:solidFill>
-                  <a:srgbClr val="1F2328"/>
-                </a:solidFill>
-                <a:effectLst/>
-                <a:latin typeface="-apple-system"/>
-              </a:rPr>
-              <a:t>Root Mean Squared Error (RMSE) of 1.35 (sales price is in the units of </a:t>
-            </a:r>
-            <a:r>
-              <a:rPr lang="en-US" sz="2000" dirty="0">
-                <a:solidFill>
-                  <a:srgbClr val="1F2328"/>
-                </a:solidFill>
-                <a:latin typeface="-apple-system"/>
-              </a:rPr>
-              <a:t>1</a:t>
-            </a:r>
-            <a:r>
-              <a:rPr lang="en-US" sz="2000" b="0" i="0" dirty="0">
-                <a:solidFill>
-                  <a:srgbClr val="1F2328"/>
-                </a:solidFill>
-                <a:effectLst/>
-                <a:latin typeface="-apple-system"/>
-              </a:rPr>
-              <a:t>00000 INR) and </a:t>
-            </a:r>
-            <a:r>
-              <a:rPr lang="en-US" sz="2000" dirty="0"/>
-              <a:t>R2=0.73.</a:t>
-            </a:r>
-          </a:p>
-          <a:p>
-            <a:pPr marL="285750" indent="-285750">
-              <a:buFont typeface="Wingdings" charset="2"/>
-              <a:buChar char="q"/>
-            </a:pPr>
-            <a:r>
-              <a:rPr lang="en-US" sz="2000" dirty="0">
-                <a:solidFill>
-                  <a:srgbClr val="1F2328"/>
-                </a:solidFill>
-                <a:latin typeface="-apple-system"/>
-              </a:rPr>
-              <a:t>C</a:t>
-            </a:r>
-            <a:r>
-              <a:rPr lang="en-US" sz="2000" b="0" i="0" dirty="0">
-                <a:solidFill>
-                  <a:srgbClr val="1F2328"/>
-                </a:solidFill>
-                <a:effectLst/>
-                <a:latin typeface="-apple-system"/>
-              </a:rPr>
-              <a:t>alculate residuals (difference between predicted label values and true values) and check </a:t>
-            </a:r>
-            <a:r>
-              <a:rPr lang="en-US" sz="2000" b="0" i="0" dirty="0">
-                <a:solidFill>
-                  <a:srgbClr val="001D35"/>
-                </a:solidFill>
-                <a:effectLst/>
-                <a:latin typeface="Google Sans"/>
-              </a:rPr>
-              <a:t>Linear Regression assumptions</a:t>
-            </a:r>
-            <a:endParaRPr lang="en-US" sz="2000" b="0" i="0" dirty="0">
-              <a:solidFill>
-                <a:srgbClr val="1F2328"/>
-              </a:solidFill>
-              <a:effectLst/>
-              <a:latin typeface="-apple-system"/>
-            </a:endParaRPr>
-          </a:p>
-        </p:txBody>
-      </p:sp>
+      <mc:AlternateContent xmlns:mc="http://schemas.openxmlformats.org/markup-compatibility/2006" xmlns:a14="http://schemas.microsoft.com/office/drawing/2010/main">
+        <mc:Choice Requires="a14">
+          <p:sp>
+            <p:nvSpPr>
+              <p:cNvPr id="2" name="TextBox 1"/>
+              <p:cNvSpPr txBox="1"/>
+              <p:nvPr/>
+            </p:nvSpPr>
+            <p:spPr>
+              <a:xfrm>
+                <a:off x="347663" y="708553"/>
+                <a:ext cx="11006137" cy="1042017"/>
+              </a:xfrm>
+              <a:prstGeom prst="rect">
+                <a:avLst/>
+              </a:prstGeom>
+              <a:noFill/>
+            </p:spPr>
+            <p:txBody>
+              <a:bodyPr wrap="square" rtlCol="0">
+                <a:spAutoFit/>
+              </a:bodyPr>
+              <a:lstStyle/>
+              <a:p>
+                <a:pPr marL="285750" indent="-285750">
+                  <a:buFont typeface="Wingdings" charset="2"/>
+                  <a:buChar char="q"/>
+                </a:pPr>
+                <a:r>
+                  <a:rPr lang="en-US" sz="2000" b="0" i="0" dirty="0">
+                    <a:solidFill>
+                      <a:srgbClr val="1F2328"/>
+                    </a:solidFill>
+                    <a:effectLst/>
+                    <a:latin typeface="-apple-system"/>
+                  </a:rPr>
+                  <a:t>Root Mean Squared Error (RMSE) of 1.36 (sales price is in the units of </a:t>
+                </a:r>
+                <a:r>
+                  <a:rPr lang="en-US" sz="2000" dirty="0">
+                    <a:solidFill>
+                      <a:srgbClr val="1F2328"/>
+                    </a:solidFill>
+                    <a:latin typeface="-apple-system"/>
+                  </a:rPr>
+                  <a:t>1</a:t>
+                </a:r>
+                <a:r>
+                  <a:rPr lang="en-US" sz="2000" b="0" i="0" dirty="0">
+                    <a:solidFill>
+                      <a:srgbClr val="1F2328"/>
+                    </a:solidFill>
+                    <a:effectLst/>
+                    <a:latin typeface="-apple-system"/>
+                  </a:rPr>
+                  <a:t>00000 INR) and </a:t>
+                </a:r>
+                <a14:m>
+                  <m:oMath xmlns:m="http://schemas.openxmlformats.org/officeDocument/2006/math">
+                    <m:sSup>
+                      <m:sSupPr>
+                        <m:ctrlPr>
+                          <a:rPr lang="en-US" sz="2000" b="0" i="1" smtClean="0">
+                            <a:solidFill>
+                              <a:srgbClr val="1F2328"/>
+                            </a:solidFill>
+                            <a:effectLst/>
+                            <a:latin typeface="Cambria Math" panose="02040503050406030204" pitchFamily="18" charset="0"/>
+                          </a:rPr>
+                        </m:ctrlPr>
+                      </m:sSupPr>
+                      <m:e>
+                        <m:r>
+                          <a:rPr lang="en-US" sz="2000" b="0" i="1" smtClean="0">
+                            <a:solidFill>
+                              <a:srgbClr val="1F2328"/>
+                            </a:solidFill>
+                            <a:effectLst/>
+                            <a:latin typeface="Cambria Math" panose="02040503050406030204" pitchFamily="18" charset="0"/>
+                          </a:rPr>
+                          <m:t>𝑅</m:t>
+                        </m:r>
+                      </m:e>
+                      <m:sup>
+                        <m:r>
+                          <a:rPr lang="en-US" sz="2000" b="0" i="1" smtClean="0">
+                            <a:solidFill>
+                              <a:srgbClr val="1F2328"/>
+                            </a:solidFill>
+                            <a:effectLst/>
+                            <a:latin typeface="Cambria Math" panose="02040503050406030204" pitchFamily="18" charset="0"/>
+                          </a:rPr>
+                          <m:t>2</m:t>
+                        </m:r>
+                      </m:sup>
+                    </m:sSup>
+                    <m:r>
+                      <m:rPr>
+                        <m:nor/>
+                      </m:rPr>
+                      <a:rPr lang="en-US" sz="2000" dirty="0"/>
+                      <m:t>=0.72</m:t>
+                    </m:r>
+                  </m:oMath>
+                </a14:m>
+                <a:r>
+                  <a:rPr lang="en-US" sz="2000" dirty="0"/>
+                  <a:t>.</a:t>
+                </a:r>
+              </a:p>
+              <a:p>
+                <a:pPr marL="285750" indent="-285750">
+                  <a:buFont typeface="Wingdings" charset="2"/>
+                  <a:buChar char="q"/>
+                </a:pPr>
+                <a:r>
+                  <a:rPr lang="en-US" sz="2000" dirty="0">
+                    <a:solidFill>
+                      <a:srgbClr val="1F2328"/>
+                    </a:solidFill>
+                    <a:latin typeface="-apple-system"/>
+                  </a:rPr>
+                  <a:t>C</a:t>
+                </a:r>
+                <a:r>
+                  <a:rPr lang="en-US" sz="2000" b="0" i="0" dirty="0">
+                    <a:solidFill>
+                      <a:srgbClr val="1F2328"/>
+                    </a:solidFill>
+                    <a:effectLst/>
+                    <a:latin typeface="-apple-system"/>
+                  </a:rPr>
+                  <a:t>alculate residuals (difference between predicted label values and true values) and check </a:t>
+                </a:r>
+                <a:r>
+                  <a:rPr lang="en-US" sz="2000" b="0" i="0" dirty="0">
+                    <a:solidFill>
+                      <a:srgbClr val="001D35"/>
+                    </a:solidFill>
+                    <a:effectLst/>
+                    <a:latin typeface="Google Sans"/>
+                  </a:rPr>
+                  <a:t>Linear Regression assumptions</a:t>
+                </a:r>
+                <a:endParaRPr lang="en-US" sz="2000" b="0" i="0" dirty="0">
+                  <a:solidFill>
+                    <a:srgbClr val="1F2328"/>
+                  </a:solidFill>
+                  <a:effectLst/>
+                  <a:latin typeface="-apple-system"/>
+                </a:endParaRPr>
+              </a:p>
+            </p:txBody>
+          </p:sp>
+        </mc:Choice>
+        <mc:Fallback xmlns="">
+          <p:sp>
+            <p:nvSpPr>
+              <p:cNvPr id="2" name="TextBox 1"/>
+              <p:cNvSpPr txBox="1">
+                <a:spLocks noRot="1" noChangeAspect="1" noMove="1" noResize="1" noEditPoints="1" noAdjustHandles="1" noChangeArrowheads="1" noChangeShapeType="1" noTextEdit="1"/>
+              </p:cNvSpPr>
+              <p:nvPr/>
+            </p:nvSpPr>
+            <p:spPr>
+              <a:xfrm>
+                <a:off x="347663" y="708553"/>
+                <a:ext cx="11006137" cy="1042017"/>
+              </a:xfrm>
+              <a:prstGeom prst="rect">
+                <a:avLst/>
+              </a:prstGeom>
+              <a:blipFill>
+                <a:blip r:embed="rId3"/>
+                <a:stretch>
+                  <a:fillRect l="-498" t="-2924" b="-7018"/>
+                </a:stretch>
+              </a:blipFill>
+            </p:spPr>
+            <p:txBody>
+              <a:bodyPr/>
+              <a:lstStyle/>
+              <a:p>
+                <a:r>
+                  <a:rPr lang="en-US">
+                    <a:noFill/>
+                  </a:rPr>
+                  <a:t> </a:t>
+                </a:r>
+              </a:p>
+            </p:txBody>
+          </p:sp>
+        </mc:Fallback>
+      </mc:AlternateContent>
       <p:sp>
         <p:nvSpPr>
           <p:cNvPr id="6" name="TextBox 5">
@@ -7038,7 +7128,7 @@
           <p:nvPr/>
         </p:nvPicPr>
         <p:blipFill>
-          <a:blip r:embed="rId3">
+          <a:blip r:embed="rId4">
             <a:extLst>
               <a:ext uri="{28A0092B-C50C-407E-A947-70E740481C1C}">
                 <a14:useLocalDpi xmlns:a14="http://schemas.microsoft.com/office/drawing/2010/main" val="0"/>
@@ -7074,7 +7164,7 @@
           <p:nvPr/>
         </p:nvPicPr>
         <p:blipFill>
-          <a:blip r:embed="rId4">
+          <a:blip r:embed="rId5">
             <a:extLst>
               <a:ext uri="{28A0092B-C50C-407E-A947-70E740481C1C}">
                 <a14:useLocalDpi xmlns:a14="http://schemas.microsoft.com/office/drawing/2010/main" val="0"/>
@@ -7454,7 +7544,7 @@
               <p:nvPr>
                 <p:extLst>
                   <p:ext uri="{D42A27DB-BD31-4B8C-83A1-F6EECF244321}">
-                    <p14:modId xmlns:p14="http://schemas.microsoft.com/office/powerpoint/2010/main" val="66312455"/>
+                    <p14:modId xmlns:p14="http://schemas.microsoft.com/office/powerpoint/2010/main" val="3675491973"/>
                   </p:ext>
                 </p:extLst>
               </p:nvPr>
@@ -7632,7 +7722,7 @@
                         <a:p>
                           <a:r>
                             <a:rPr lang="en-US" dirty="0"/>
-                            <a:t>1.02</a:t>
+                            <a:t>1.04</a:t>
                           </a:r>
                         </a:p>
                       </a:txBody>
@@ -7645,7 +7735,7 @@
                         <a:p>
                           <a:r>
                             <a:rPr lang="en-US" dirty="0"/>
-                            <a:t>1.35</a:t>
+                            <a:t>1.36</a:t>
                           </a:r>
                         </a:p>
                       </a:txBody>
@@ -7671,7 +7761,7 @@
                         <a:p>
                           <a:r>
                             <a:rPr lang="en-US" dirty="0"/>
-                            <a:t>0.73</a:t>
+                            <a:t>0.72</a:t>
                           </a:r>
                         </a:p>
                       </a:txBody>
@@ -7712,7 +7802,7 @@
                         <a:p>
                           <a:r>
                             <a:rPr lang="en-US" dirty="0"/>
-                            <a:t>0.81</a:t>
+                            <a:t>0.82</a:t>
                           </a:r>
                         </a:p>
                       </a:txBody>
@@ -7751,7 +7841,7 @@
                         <a:p>
                           <a:r>
                             <a:rPr lang="en-US" dirty="0"/>
-                            <a:t>0.82</a:t>
+                            <a:t>0.81</a:t>
                           </a:r>
                         </a:p>
                       </a:txBody>
@@ -7771,25 +7861,7 @@
                         <a:p>
                           <a:r>
                             <a:rPr lang="en-US" dirty="0"/>
-                            <a:t>K-Nearest </a:t>
-                          </a:r>
-                          <a:r>
-                            <a:rPr lang="en-US" dirty="0" err="1"/>
-                            <a:t>Neighbours</a:t>
-                          </a:r>
-                          <a:endParaRPr lang="en-US" dirty="0"/>
-                        </a:p>
-                      </a:txBody>
-                      <a:tcPr/>
-                    </a:tc>
-                    <a:tc>
-                      <a:txBody>
-                        <a:bodyPr/>
-                        <a:lstStyle/>
-                        <a:p>
-                          <a:r>
-                            <a:rPr lang="en-US" dirty="0"/>
-                            <a:t>0.78</a:t>
+                            <a:t>K-Nearest Neighbors</a:t>
                           </a:r>
                         </a:p>
                       </a:txBody>
@@ -7802,7 +7874,7 @@
                         <a:p>
                           <a:r>
                             <a:rPr lang="en-US" dirty="0"/>
-                            <a:t>1.13</a:t>
+                            <a:t>1.41</a:t>
                           </a:r>
                         </a:p>
                       </a:txBody>
@@ -7815,7 +7887,7 @@
                         <a:p>
                           <a:r>
                             <a:rPr lang="en-US" dirty="0"/>
-                            <a:t>22%</a:t>
+                            <a:t>1.98</a:t>
                           </a:r>
                         </a:p>
                       </a:txBody>
@@ -7828,7 +7900,20 @@
                         <a:p>
                           <a:r>
                             <a:rPr lang="en-US" dirty="0"/>
-                            <a:t>0.81</a:t>
+                            <a:t>44%</a:t>
+                          </a:r>
+                        </a:p>
+                      </a:txBody>
+                      <a:tcPr/>
+                    </a:tc>
+                    <a:tc>
+                      <a:txBody>
+                        <a:bodyPr/>
+                        <a:lstStyle/>
+                        <a:p>
+                          <a:r>
+                            <a:rPr lang="en-US" dirty="0"/>
+                            <a:t>0.41</a:t>
                           </a:r>
                         </a:p>
                       </a:txBody>
@@ -7861,7 +7946,7 @@
                         <a:p>
                           <a:r>
                             <a:rPr lang="en-US" dirty="0"/>
-                            <a:t>0.76</a:t>
+                            <a:t>1.53</a:t>
                           </a:r>
                         </a:p>
                       </a:txBody>
@@ -7874,7 +7959,7 @@
                         <a:p>
                           <a:r>
                             <a:rPr lang="en-US" dirty="0"/>
-                            <a:t>1.09</a:t>
+                            <a:t>2.11</a:t>
                           </a:r>
                         </a:p>
                       </a:txBody>
@@ -7887,7 +7972,7 @@
                         <a:p>
                           <a:r>
                             <a:rPr lang="en-US" dirty="0"/>
-                            <a:t>20%</a:t>
+                            <a:t>54%</a:t>
                           </a:r>
                         </a:p>
                       </a:txBody>
@@ -7899,9 +7984,10 @@
                         <a:lstStyle/>
                         <a:p>
                           <a:r>
-                            <a:rPr lang="en-US" dirty="0"/>
-                            <a:t>0.82</a:t>
+                            <a:rPr lang="en-US"/>
+                            <a:t>0.33</a:t>
                           </a:r>
+                          <a:endParaRPr lang="en-US" dirty="0"/>
                         </a:p>
                       </a:txBody>
                       <a:tcPr/>
@@ -8006,7 +8092,7 @@
               <p:nvPr>
                 <p:extLst>
                   <p:ext uri="{D42A27DB-BD31-4B8C-83A1-F6EECF244321}">
-                    <p14:modId xmlns:p14="http://schemas.microsoft.com/office/powerpoint/2010/main" val="66312455"/>
+                    <p14:modId xmlns:p14="http://schemas.microsoft.com/office/powerpoint/2010/main" val="3675491973"/>
                   </p:ext>
                 </p:extLst>
               </p:nvPr>
@@ -8156,7 +8242,7 @@
                         <a:p>
                           <a:r>
                             <a:rPr lang="en-US" dirty="0"/>
-                            <a:t>1.02</a:t>
+                            <a:t>1.04</a:t>
                           </a:r>
                         </a:p>
                       </a:txBody>
@@ -8169,7 +8255,7 @@
                         <a:p>
                           <a:r>
                             <a:rPr lang="en-US" dirty="0"/>
-                            <a:t>1.35</a:t>
+                            <a:t>1.36</a:t>
                           </a:r>
                         </a:p>
                       </a:txBody>
@@ -8195,7 +8281,7 @@
                         <a:p>
                           <a:r>
                             <a:rPr lang="en-US" dirty="0"/>
-                            <a:t>0.73</a:t>
+                            <a:t>0.72</a:t>
                           </a:r>
                         </a:p>
                       </a:txBody>
@@ -8236,7 +8322,7 @@
                         <a:p>
                           <a:r>
                             <a:rPr lang="en-US" dirty="0"/>
-                            <a:t>0.81</a:t>
+                            <a:t>0.82</a:t>
                           </a:r>
                         </a:p>
                       </a:txBody>
@@ -8275,7 +8361,7 @@
                         <a:p>
                           <a:r>
                             <a:rPr lang="en-US" dirty="0"/>
-                            <a:t>0.82</a:t>
+                            <a:t>0.81</a:t>
                           </a:r>
                         </a:p>
                       </a:txBody>
@@ -8295,25 +8381,7 @@
                         <a:p>
                           <a:r>
                             <a:rPr lang="en-US" dirty="0"/>
-                            <a:t>K-Nearest </a:t>
-                          </a:r>
-                          <a:r>
-                            <a:rPr lang="en-US" dirty="0" err="1"/>
-                            <a:t>Neighbours</a:t>
-                          </a:r>
-                          <a:endParaRPr lang="en-US" dirty="0"/>
-                        </a:p>
-                      </a:txBody>
-                      <a:tcPr/>
-                    </a:tc>
-                    <a:tc>
-                      <a:txBody>
-                        <a:bodyPr/>
-                        <a:lstStyle/>
-                        <a:p>
-                          <a:r>
-                            <a:rPr lang="en-US" dirty="0"/>
-                            <a:t>0.78</a:t>
+                            <a:t>K-Nearest Neighbors</a:t>
                           </a:r>
                         </a:p>
                       </a:txBody>
@@ -8326,7 +8394,7 @@
                         <a:p>
                           <a:r>
                             <a:rPr lang="en-US" dirty="0"/>
-                            <a:t>1.13</a:t>
+                            <a:t>1.41</a:t>
                           </a:r>
                         </a:p>
                       </a:txBody>
@@ -8339,7 +8407,7 @@
                         <a:p>
                           <a:r>
                             <a:rPr lang="en-US" dirty="0"/>
-                            <a:t>22%</a:t>
+                            <a:t>1.98</a:t>
                           </a:r>
                         </a:p>
                       </a:txBody>
@@ -8352,7 +8420,20 @@
                         <a:p>
                           <a:r>
                             <a:rPr lang="en-US" dirty="0"/>
-                            <a:t>0.81</a:t>
+                            <a:t>44%</a:t>
+                          </a:r>
+                        </a:p>
+                      </a:txBody>
+                      <a:tcPr/>
+                    </a:tc>
+                    <a:tc>
+                      <a:txBody>
+                        <a:bodyPr/>
+                        <a:lstStyle/>
+                        <a:p>
+                          <a:r>
+                            <a:rPr lang="en-US" dirty="0"/>
+                            <a:t>0.41</a:t>
                           </a:r>
                         </a:p>
                       </a:txBody>
@@ -8385,7 +8466,7 @@
                         <a:p>
                           <a:r>
                             <a:rPr lang="en-US" dirty="0"/>
-                            <a:t>0.76</a:t>
+                            <a:t>1.53</a:t>
                           </a:r>
                         </a:p>
                       </a:txBody>
@@ -8398,7 +8479,7 @@
                         <a:p>
                           <a:r>
                             <a:rPr lang="en-US" dirty="0"/>
-                            <a:t>1.09</a:t>
+                            <a:t>2.11</a:t>
                           </a:r>
                         </a:p>
                       </a:txBody>
@@ -8411,7 +8492,7 @@
                         <a:p>
                           <a:r>
                             <a:rPr lang="en-US" dirty="0"/>
-                            <a:t>20%</a:t>
+                            <a:t>54%</a:t>
                           </a:r>
                         </a:p>
                       </a:txBody>
@@ -8423,9 +8504,10 @@
                         <a:lstStyle/>
                         <a:p>
                           <a:r>
-                            <a:rPr lang="en-US" dirty="0"/>
-                            <a:t>0.82</a:t>
+                            <a:rPr lang="en-US"/>
+                            <a:t>0.33</a:t>
                           </a:r>
+                          <a:endParaRPr lang="en-US" dirty="0"/>
                         </a:p>
                       </a:txBody>
                       <a:tcPr/>
@@ -9356,8 +9438,8 @@
           </a:p>
         </p:txBody>
       </p:sp>
-      <mc:AlternateContent xmlns:mc="http://schemas.openxmlformats.org/markup-compatibility/2006">
-        <mc:Choice xmlns:a14="http://schemas.microsoft.com/office/drawing/2010/main" Requires="a14">
+      <mc:AlternateContent xmlns:mc="http://schemas.openxmlformats.org/markup-compatibility/2006" xmlns:a14="http://schemas.microsoft.com/office/drawing/2010/main">
+        <mc:Choice Requires="a14">
           <p:sp>
             <p:nvSpPr>
               <p:cNvPr id="2" name="TextBox 1"/>
@@ -9670,7 +9752,7 @@
             </p:txBody>
           </p:sp>
         </mc:Choice>
-        <mc:Fallback>
+        <mc:Fallback xmlns="">
           <p:sp>
             <p:nvSpPr>
               <p:cNvPr id="2" name="TextBox 1"/>

</xml_diff>

<commit_message>
Updating model after adding scaling
</commit_message>
<xml_diff>
--- a/Report/Erdosfall2024_Car_sales_price_prediction_talk.pptx
+++ b/Report/Erdosfall2024_Car_sales_price_prediction_talk.pptx
@@ -204,7 +204,7 @@
           <a:p>
             <a:fld id="{7D1BD353-0E3F-4F7F-B2DA-DDB1E24F65DD}" type="datetimeFigureOut">
               <a:rPr lang="en-US" smtClean="0"/>
-              <a:t>12/16/2024</a:t>
+              <a:t>12/17/2024</a:t>
             </a:fld>
             <a:endParaRPr lang="en-US"/>
           </a:p>
@@ -1140,7 +1140,7 @@
           <a:p>
             <a:fld id="{8C737111-AB33-4E78-99FF-07CB70C4A694}" type="datetimeFigureOut">
               <a:rPr lang="en-US" smtClean="0"/>
-              <a:t>12/16/2024</a:t>
+              <a:t>12/17/2024</a:t>
             </a:fld>
             <a:endParaRPr lang="en-US"/>
           </a:p>
@@ -1338,7 +1338,7 @@
           <a:p>
             <a:fld id="{8C737111-AB33-4E78-99FF-07CB70C4A694}" type="datetimeFigureOut">
               <a:rPr lang="en-US" smtClean="0"/>
-              <a:t>12/16/2024</a:t>
+              <a:t>12/17/2024</a:t>
             </a:fld>
             <a:endParaRPr lang="en-US"/>
           </a:p>
@@ -1546,7 +1546,7 @@
           <a:p>
             <a:fld id="{8C737111-AB33-4E78-99FF-07CB70C4A694}" type="datetimeFigureOut">
               <a:rPr lang="en-US" smtClean="0"/>
-              <a:t>12/16/2024</a:t>
+              <a:t>12/17/2024</a:t>
             </a:fld>
             <a:endParaRPr lang="en-US"/>
           </a:p>
@@ -1744,7 +1744,7 @@
           <a:p>
             <a:fld id="{8C737111-AB33-4E78-99FF-07CB70C4A694}" type="datetimeFigureOut">
               <a:rPr lang="en-US" smtClean="0"/>
-              <a:t>12/16/2024</a:t>
+              <a:t>12/17/2024</a:t>
             </a:fld>
             <a:endParaRPr lang="en-US"/>
           </a:p>
@@ -2019,7 +2019,7 @@
           <a:p>
             <a:fld id="{8C737111-AB33-4E78-99FF-07CB70C4A694}" type="datetimeFigureOut">
               <a:rPr lang="en-US" smtClean="0"/>
-              <a:t>12/16/2024</a:t>
+              <a:t>12/17/2024</a:t>
             </a:fld>
             <a:endParaRPr lang="en-US"/>
           </a:p>
@@ -2284,7 +2284,7 @@
           <a:p>
             <a:fld id="{8C737111-AB33-4E78-99FF-07CB70C4A694}" type="datetimeFigureOut">
               <a:rPr lang="en-US" smtClean="0"/>
-              <a:t>12/16/2024</a:t>
+              <a:t>12/17/2024</a:t>
             </a:fld>
             <a:endParaRPr lang="en-US"/>
           </a:p>
@@ -2696,7 +2696,7 @@
           <a:p>
             <a:fld id="{8C737111-AB33-4E78-99FF-07CB70C4A694}" type="datetimeFigureOut">
               <a:rPr lang="en-US" smtClean="0"/>
-              <a:t>12/16/2024</a:t>
+              <a:t>12/17/2024</a:t>
             </a:fld>
             <a:endParaRPr lang="en-US"/>
           </a:p>
@@ -2837,7 +2837,7 @@
           <a:p>
             <a:fld id="{8C737111-AB33-4E78-99FF-07CB70C4A694}" type="datetimeFigureOut">
               <a:rPr lang="en-US" smtClean="0"/>
-              <a:t>12/16/2024</a:t>
+              <a:t>12/17/2024</a:t>
             </a:fld>
             <a:endParaRPr lang="en-US"/>
           </a:p>
@@ -2950,7 +2950,7 @@
           <a:p>
             <a:fld id="{8C737111-AB33-4E78-99FF-07CB70C4A694}" type="datetimeFigureOut">
               <a:rPr lang="en-US" smtClean="0"/>
-              <a:t>12/16/2024</a:t>
+              <a:t>12/17/2024</a:t>
             </a:fld>
             <a:endParaRPr lang="en-US"/>
           </a:p>
@@ -3261,7 +3261,7 @@
           <a:p>
             <a:fld id="{8C737111-AB33-4E78-99FF-07CB70C4A694}" type="datetimeFigureOut">
               <a:rPr lang="en-US" smtClean="0"/>
-              <a:t>12/16/2024</a:t>
+              <a:t>12/17/2024</a:t>
             </a:fld>
             <a:endParaRPr lang="en-US"/>
           </a:p>
@@ -3549,7 +3549,7 @@
           <a:p>
             <a:fld id="{8C737111-AB33-4E78-99FF-07CB70C4A694}" type="datetimeFigureOut">
               <a:rPr lang="en-US" smtClean="0"/>
-              <a:t>12/16/2024</a:t>
+              <a:t>12/17/2024</a:t>
             </a:fld>
             <a:endParaRPr lang="en-US"/>
           </a:p>
@@ -3790,7 +3790,7 @@
           <a:p>
             <a:fld id="{8C737111-AB33-4E78-99FF-07CB70C4A694}" type="datetimeFigureOut">
               <a:rPr lang="en-US" smtClean="0"/>
-              <a:t>12/16/2024</a:t>
+              <a:t>12/17/2024</a:t>
             </a:fld>
             <a:endParaRPr lang="en-US"/>
           </a:p>
@@ -7544,7 +7544,7 @@
               <p:nvPr>
                 <p:extLst>
                   <p:ext uri="{D42A27DB-BD31-4B8C-83A1-F6EECF244321}">
-                    <p14:modId xmlns:p14="http://schemas.microsoft.com/office/powerpoint/2010/main" val="3675491973"/>
+                    <p14:modId xmlns:p14="http://schemas.microsoft.com/office/powerpoint/2010/main" val="1986739971"/>
                   </p:ext>
                 </p:extLst>
               </p:nvPr>
@@ -7874,7 +7874,7 @@
                         <a:p>
                           <a:r>
                             <a:rPr lang="en-US" dirty="0"/>
-                            <a:t>1.41</a:t>
+                            <a:t>0.83</a:t>
                           </a:r>
                         </a:p>
                       </a:txBody>
@@ -7887,7 +7887,7 @@
                         <a:p>
                           <a:r>
                             <a:rPr lang="en-US" dirty="0"/>
-                            <a:t>1.98</a:t>
+                            <a:t>1.20</a:t>
                           </a:r>
                         </a:p>
                       </a:txBody>
@@ -7900,7 +7900,7 @@
                         <a:p>
                           <a:r>
                             <a:rPr lang="en-US" dirty="0"/>
-                            <a:t>44%</a:t>
+                            <a:t>23%</a:t>
                           </a:r>
                         </a:p>
                       </a:txBody>
@@ -7913,7 +7913,7 @@
                         <a:p>
                           <a:r>
                             <a:rPr lang="en-US" dirty="0"/>
-                            <a:t>0.41</a:t>
+                            <a:t>0.78</a:t>
                           </a:r>
                         </a:p>
                       </a:txBody>
@@ -7946,7 +7946,7 @@
                         <a:p>
                           <a:r>
                             <a:rPr lang="en-US" dirty="0"/>
-                            <a:t>1.53</a:t>
+                            <a:t>0.76</a:t>
                           </a:r>
                         </a:p>
                       </a:txBody>
@@ -7959,7 +7959,7 @@
                         <a:p>
                           <a:r>
                             <a:rPr lang="en-US" dirty="0"/>
-                            <a:t>2.11</a:t>
+                            <a:t>1.07</a:t>
                           </a:r>
                         </a:p>
                       </a:txBody>
@@ -7972,7 +7972,7 @@
                         <a:p>
                           <a:r>
                             <a:rPr lang="en-US" dirty="0"/>
-                            <a:t>54%</a:t>
+                            <a:t>20%</a:t>
                           </a:r>
                         </a:p>
                       </a:txBody>
@@ -7984,10 +7984,9 @@
                         <a:lstStyle/>
                         <a:p>
                           <a:r>
-                            <a:rPr lang="en-US"/>
-                            <a:t>0.33</a:t>
+                            <a:rPr lang="en-US" dirty="0"/>
+                            <a:t>0.83</a:t>
                           </a:r>
-                          <a:endParaRPr lang="en-US" dirty="0"/>
                         </a:p>
                       </a:txBody>
                       <a:tcPr/>
@@ -8033,7 +8032,7 @@
                         <a:p>
                           <a:r>
                             <a:rPr lang="en-US" dirty="0"/>
-                            <a:t>0.87</a:t>
+                            <a:t>0.86</a:t>
                           </a:r>
                         </a:p>
                       </a:txBody>
@@ -8059,7 +8058,7 @@
                         <a:p>
                           <a:r>
                             <a:rPr lang="en-US" dirty="0"/>
-                            <a:t>0.89 </a:t>
+                            <a:t>0.88</a:t>
                           </a:r>
                         </a:p>
                       </a:txBody>
@@ -8092,7 +8091,7 @@
               <p:nvPr>
                 <p:extLst>
                   <p:ext uri="{D42A27DB-BD31-4B8C-83A1-F6EECF244321}">
-                    <p14:modId xmlns:p14="http://schemas.microsoft.com/office/powerpoint/2010/main" val="3675491973"/>
+                    <p14:modId xmlns:p14="http://schemas.microsoft.com/office/powerpoint/2010/main" val="1986739971"/>
                   </p:ext>
                 </p:extLst>
               </p:nvPr>
@@ -8394,7 +8393,7 @@
                         <a:p>
                           <a:r>
                             <a:rPr lang="en-US" dirty="0"/>
-                            <a:t>1.41</a:t>
+                            <a:t>0.83</a:t>
                           </a:r>
                         </a:p>
                       </a:txBody>
@@ -8407,7 +8406,7 @@
                         <a:p>
                           <a:r>
                             <a:rPr lang="en-US" dirty="0"/>
-                            <a:t>1.98</a:t>
+                            <a:t>1.20</a:t>
                           </a:r>
                         </a:p>
                       </a:txBody>
@@ -8420,7 +8419,7 @@
                         <a:p>
                           <a:r>
                             <a:rPr lang="en-US" dirty="0"/>
-                            <a:t>44%</a:t>
+                            <a:t>23%</a:t>
                           </a:r>
                         </a:p>
                       </a:txBody>
@@ -8433,7 +8432,7 @@
                         <a:p>
                           <a:r>
                             <a:rPr lang="en-US" dirty="0"/>
-                            <a:t>0.41</a:t>
+                            <a:t>0.78</a:t>
                           </a:r>
                         </a:p>
                       </a:txBody>
@@ -8466,7 +8465,7 @@
                         <a:p>
                           <a:r>
                             <a:rPr lang="en-US" dirty="0"/>
-                            <a:t>1.53</a:t>
+                            <a:t>0.76</a:t>
                           </a:r>
                         </a:p>
                       </a:txBody>
@@ -8479,7 +8478,7 @@
                         <a:p>
                           <a:r>
                             <a:rPr lang="en-US" dirty="0"/>
-                            <a:t>2.11</a:t>
+                            <a:t>1.07</a:t>
                           </a:r>
                         </a:p>
                       </a:txBody>
@@ -8492,7 +8491,7 @@
                         <a:p>
                           <a:r>
                             <a:rPr lang="en-US" dirty="0"/>
-                            <a:t>54%</a:t>
+                            <a:t>20%</a:t>
                           </a:r>
                         </a:p>
                       </a:txBody>
@@ -8504,10 +8503,9 @@
                         <a:lstStyle/>
                         <a:p>
                           <a:r>
-                            <a:rPr lang="en-US"/>
-                            <a:t>0.33</a:t>
+                            <a:rPr lang="en-US" dirty="0"/>
+                            <a:t>0.83</a:t>
                           </a:r>
-                          <a:endParaRPr lang="en-US" dirty="0"/>
                         </a:p>
                       </a:txBody>
                       <a:tcPr/>
@@ -8553,7 +8551,7 @@
                         <a:p>
                           <a:r>
                             <a:rPr lang="en-US" dirty="0"/>
-                            <a:t>0.87</a:t>
+                            <a:t>0.86</a:t>
                           </a:r>
                         </a:p>
                       </a:txBody>
@@ -8579,7 +8577,7 @@
                         <a:p>
                           <a:r>
                             <a:rPr lang="en-US" dirty="0"/>
-                            <a:t>0.89 </a:t>
+                            <a:t>0.88</a:t>
                           </a:r>
                         </a:p>
                       </a:txBody>
@@ -9438,8 +9436,8 @@
           </a:p>
         </p:txBody>
       </p:sp>
-      <mc:AlternateContent xmlns:mc="http://schemas.openxmlformats.org/markup-compatibility/2006" xmlns:a14="http://schemas.microsoft.com/office/drawing/2010/main">
-        <mc:Choice Requires="a14">
+      <mc:AlternateContent xmlns:mc="http://schemas.openxmlformats.org/markup-compatibility/2006">
+        <mc:Choice xmlns:a14="http://schemas.microsoft.com/office/drawing/2010/main" Requires="a14">
           <p:sp>
             <p:nvSpPr>
               <p:cNvPr id="2" name="TextBox 1"/>
@@ -9588,9 +9586,10 @@
                   </m:oMath>
                 </a14:m>
                 <a:r>
-                  <a:rPr lang="en-US" sz="2000" dirty="0"/>
-                  <a:t>=0.89</a:t>
+                  <a:rPr lang="en-US" sz="2000"/>
+                  <a:t>=0.88</a:t>
                 </a:r>
+                <a:endParaRPr lang="en-US" sz="2000" dirty="0"/>
               </a:p>
               <a:p>
                 <a:pPr marL="285750" indent="-285750">
@@ -9752,7 +9751,7 @@
             </p:txBody>
           </p:sp>
         </mc:Choice>
-        <mc:Fallback xmlns="">
+        <mc:Fallback>
           <p:sp>
             <p:nvSpPr>
               <p:cNvPr id="2" name="TextBox 1"/>

</xml_diff>